<commit_message>
updated figures and script ReadMe for additional controls
</commit_message>
<xml_diff>
--- a/figures/final_figs/Fig2/CCAmode.pptx
+++ b/figures/final_figs/Fig2/CCAmode.pptx
@@ -197,7 +197,7 @@
           <a:p>
             <a:fld id="{BA04BA72-A4F4-C047-990E-3DBEE34A1341}" type="datetimeFigureOut">
               <a:rPr lang="en-DK" smtClean="0"/>
-              <a:t>04/12/2023</a:t>
+              <a:t>30/04/2024</a:t>
             </a:fld>
             <a:endParaRPr lang="en-DK"/>
           </a:p>
@@ -698,7 +698,7 @@
           <a:p>
             <a:fld id="{7DDDC050-38A8-4345-B03D-0BCEEAE44E94}" type="datetimeFigureOut">
               <a:rPr lang="en-DK" smtClean="0"/>
-              <a:t>04/12/2023</a:t>
+              <a:t>30/04/2024</a:t>
             </a:fld>
             <a:endParaRPr lang="en-DK"/>
           </a:p>
@@ -898,7 +898,7 @@
           <a:p>
             <a:fld id="{7DDDC050-38A8-4345-B03D-0BCEEAE44E94}" type="datetimeFigureOut">
               <a:rPr lang="en-DK" smtClean="0"/>
-              <a:t>04/12/2023</a:t>
+              <a:t>30/04/2024</a:t>
             </a:fld>
             <a:endParaRPr lang="en-DK"/>
           </a:p>
@@ -1108,7 +1108,7 @@
           <a:p>
             <a:fld id="{7DDDC050-38A8-4345-B03D-0BCEEAE44E94}" type="datetimeFigureOut">
               <a:rPr lang="en-DK" smtClean="0"/>
-              <a:t>04/12/2023</a:t>
+              <a:t>30/04/2024</a:t>
             </a:fld>
             <a:endParaRPr lang="en-DK"/>
           </a:p>
@@ -1308,7 +1308,7 @@
           <a:p>
             <a:fld id="{7DDDC050-38A8-4345-B03D-0BCEEAE44E94}" type="datetimeFigureOut">
               <a:rPr lang="en-DK" smtClean="0"/>
-              <a:t>04/12/2023</a:t>
+              <a:t>30/04/2024</a:t>
             </a:fld>
             <a:endParaRPr lang="en-DK"/>
           </a:p>
@@ -1584,7 +1584,7 @@
           <a:p>
             <a:fld id="{7DDDC050-38A8-4345-B03D-0BCEEAE44E94}" type="datetimeFigureOut">
               <a:rPr lang="en-DK" smtClean="0"/>
-              <a:t>04/12/2023</a:t>
+              <a:t>30/04/2024</a:t>
             </a:fld>
             <a:endParaRPr lang="en-DK"/>
           </a:p>
@@ -1852,7 +1852,7 @@
           <a:p>
             <a:fld id="{7DDDC050-38A8-4345-B03D-0BCEEAE44E94}" type="datetimeFigureOut">
               <a:rPr lang="en-DK" smtClean="0"/>
-              <a:t>04/12/2023</a:t>
+              <a:t>30/04/2024</a:t>
             </a:fld>
             <a:endParaRPr lang="en-DK"/>
           </a:p>
@@ -2267,7 +2267,7 @@
           <a:p>
             <a:fld id="{7DDDC050-38A8-4345-B03D-0BCEEAE44E94}" type="datetimeFigureOut">
               <a:rPr lang="en-DK" smtClean="0"/>
-              <a:t>04/12/2023</a:t>
+              <a:t>30/04/2024</a:t>
             </a:fld>
             <a:endParaRPr lang="en-DK"/>
           </a:p>
@@ -2409,7 +2409,7 @@
           <a:p>
             <a:fld id="{7DDDC050-38A8-4345-B03D-0BCEEAE44E94}" type="datetimeFigureOut">
               <a:rPr lang="en-DK" smtClean="0"/>
-              <a:t>04/12/2023</a:t>
+              <a:t>30/04/2024</a:t>
             </a:fld>
             <a:endParaRPr lang="en-DK"/>
           </a:p>
@@ -2522,7 +2522,7 @@
           <a:p>
             <a:fld id="{7DDDC050-38A8-4345-B03D-0BCEEAE44E94}" type="datetimeFigureOut">
               <a:rPr lang="en-DK" smtClean="0"/>
-              <a:t>04/12/2023</a:t>
+              <a:t>30/04/2024</a:t>
             </a:fld>
             <a:endParaRPr lang="en-DK"/>
           </a:p>
@@ -2835,7 +2835,7 @@
           <a:p>
             <a:fld id="{7DDDC050-38A8-4345-B03D-0BCEEAE44E94}" type="datetimeFigureOut">
               <a:rPr lang="en-DK" smtClean="0"/>
-              <a:t>04/12/2023</a:t>
+              <a:t>30/04/2024</a:t>
             </a:fld>
             <a:endParaRPr lang="en-DK"/>
           </a:p>
@@ -3124,7 +3124,7 @@
           <a:p>
             <a:fld id="{7DDDC050-38A8-4345-B03D-0BCEEAE44E94}" type="datetimeFigureOut">
               <a:rPr lang="en-DK" smtClean="0"/>
-              <a:t>04/12/2023</a:t>
+              <a:t>30/04/2024</a:t>
             </a:fld>
             <a:endParaRPr lang="en-DK"/>
           </a:p>
@@ -3367,7 +3367,7 @@
           <a:p>
             <a:fld id="{7DDDC050-38A8-4345-B03D-0BCEEAE44E94}" type="datetimeFigureOut">
               <a:rPr lang="en-DK" smtClean="0"/>
-              <a:t>04/12/2023</a:t>
+              <a:t>30/04/2024</a:t>
             </a:fld>
             <a:endParaRPr lang="en-DK"/>
           </a:p>
@@ -5020,8 +5020,8 @@
         </p:nvSpPr>
         <p:spPr>
           <a:xfrm>
-            <a:off x="2016981" y="154417"/>
-            <a:ext cx="6559360" cy="400110"/>
+            <a:off x="2202935" y="154417"/>
+            <a:ext cx="6187464" cy="400110"/>
           </a:xfrm>
           <a:prstGeom prst="rect">
             <a:avLst/>
@@ -5039,7 +5039,7 @@
               <a:rPr lang="en-DK" sz="2000" b="1" dirty="0">
                 <a:latin typeface="Avenir Next" panose="020B0503020202020204" pitchFamily="34" charset="0"/>
               </a:rPr>
-              <a:t>Stomach-Brain Fingerprint of Psychiatric Symptoms</a:t>
+              <a:t>Psychiatric Signature of Stomach-Brain Coupling</a:t>
             </a:r>
           </a:p>
         </p:txBody>
@@ -5110,8 +5110,8 @@
         </p:nvSpPr>
         <p:spPr>
           <a:xfrm>
-            <a:off x="6758068" y="3812647"/>
-            <a:ext cx="2565574" cy="292388"/>
+            <a:off x="6701500" y="3808105"/>
+            <a:ext cx="2784288" cy="276999"/>
           </a:xfrm>
           <a:prstGeom prst="rect">
             <a:avLst/>
@@ -5127,12 +5127,36 @@
           <a:lstStyle/>
           <a:p>
             <a:r>
-              <a:rPr lang="da-DK" sz="1300" dirty="0">
+              <a:rPr lang="da-DK" sz="1200" dirty="0">
                 <a:latin typeface="Avenir Book" panose="02000503020000020003" pitchFamily="2" charset="0"/>
               </a:rPr>
-              <a:t>Brain-Stomach Coupling Variate</a:t>
-            </a:r>
-            <a:endParaRPr lang="en-DK" sz="1300" dirty="0">
+              <a:t>Brain-Stomach </a:t>
+            </a:r>
+            <a:r>
+              <a:rPr lang="da-DK" sz="1200" dirty="0" err="1">
+                <a:latin typeface="Avenir Book" panose="02000503020000020003" pitchFamily="2" charset="0"/>
+              </a:rPr>
+              <a:t>Coupling</a:t>
+            </a:r>
+            <a:r>
+              <a:rPr lang="da-DK" sz="1200" dirty="0">
+                <a:latin typeface="Avenir Book" panose="02000503020000020003" pitchFamily="2" charset="0"/>
+              </a:rPr>
+              <a:t> CCA </a:t>
+            </a:r>
+            <a:r>
+              <a:rPr lang="da-DK" sz="1200" dirty="0" err="1">
+                <a:latin typeface="Avenir Book" panose="02000503020000020003" pitchFamily="2" charset="0"/>
+              </a:rPr>
+              <a:t>Variate</a:t>
+            </a:r>
+            <a:r>
+              <a:rPr lang="da-DK" sz="1200" dirty="0">
+                <a:latin typeface="Avenir Book" panose="02000503020000020003" pitchFamily="2" charset="0"/>
+              </a:rPr>
+              <a:t> </a:t>
+            </a:r>
+            <a:endParaRPr lang="en-DK" sz="1200" dirty="0">
               <a:latin typeface="Avenir Book" panose="02000503020000020003" pitchFamily="2" charset="0"/>
             </a:endParaRPr>
           </a:p>
@@ -5204,8 +5228,8 @@
         </p:nvSpPr>
         <p:spPr>
           <a:xfrm rot="16200000">
-            <a:off x="5632956" y="2401739"/>
-            <a:ext cx="1162947" cy="292388"/>
+            <a:off x="5517445" y="2298988"/>
+            <a:ext cx="1452192" cy="276999"/>
           </a:xfrm>
           <a:prstGeom prst="rect">
             <a:avLst/>
@@ -5221,16 +5245,16 @@
           <a:lstStyle/>
           <a:p>
             <a:r>
-              <a:rPr lang="en-GB" sz="1300" dirty="0">
+              <a:rPr lang="en-GB" sz="1200" dirty="0">
                 <a:latin typeface="Avenir Book" panose="02000503020000020003" pitchFamily="2" charset="0"/>
               </a:rPr>
               <a:t>P</a:t>
             </a:r>
             <a:r>
-              <a:rPr lang="en-DK" sz="1300" dirty="0">
+              <a:rPr lang="en-DK" sz="1200" dirty="0">
                 <a:latin typeface="Avenir Book" panose="02000503020000020003" pitchFamily="2" charset="0"/>
               </a:rPr>
-              <a:t>sych Variate</a:t>
+              <a:t>sych CCA Variate</a:t>
             </a:r>
           </a:p>
         </p:txBody>
@@ -5303,8 +5327,8 @@
         </p:nvSpPr>
         <p:spPr>
           <a:xfrm>
-            <a:off x="2691954" y="6243790"/>
-            <a:ext cx="1192442" cy="276999"/>
+            <a:off x="2566375" y="6243790"/>
+            <a:ext cx="1452642" cy="261610"/>
           </a:xfrm>
           <a:prstGeom prst="rect">
             <a:avLst/>
@@ -5318,10 +5342,10 @@
           <a:lstStyle/>
           <a:p>
             <a:r>
-              <a:rPr lang="en-DK" sz="1200" dirty="0">
+              <a:rPr lang="en-DK" sz="1100" dirty="0">
                 <a:latin typeface="Avenir Next" panose="020B0503020202020204" pitchFamily="34" charset="0"/>
               </a:rPr>
-              <a:t>Psych Loading</a:t>
+              <a:t>Psych CCA Loading</a:t>
             </a:r>
           </a:p>
         </p:txBody>
@@ -5340,8 +5364,8 @@
         </p:nvSpPr>
         <p:spPr>
           <a:xfrm>
-            <a:off x="4730664" y="6256317"/>
-            <a:ext cx="2520434" cy="276999"/>
+            <a:off x="4657824" y="6243790"/>
+            <a:ext cx="2666114" cy="261610"/>
           </a:xfrm>
           <a:prstGeom prst="rect">
             <a:avLst/>
@@ -5355,10 +5379,10 @@
           <a:lstStyle/>
           <a:p>
             <a:r>
-              <a:rPr lang="en-DK" sz="1200" dirty="0">
+              <a:rPr lang="en-DK" sz="1100" dirty="0">
                 <a:latin typeface="Avenir Next" panose="020B0503020202020204" pitchFamily="34" charset="0"/>
               </a:rPr>
-              <a:t>Brain-Stomach Coupling Loading</a:t>
+              <a:t>Brain-Stomach Coupling CCA Loading</a:t>
             </a:r>
           </a:p>
         </p:txBody>

</xml_diff>

<commit_message>
updated main figures of manuscript
</commit_message>
<xml_diff>
--- a/figures/final_figs/Fig2/CCAmode.pptx
+++ b/figures/final_figs/Fig2/CCAmode.pptx
@@ -197,7 +197,7 @@
           <a:p>
             <a:fld id="{BA04BA72-A4F4-C047-990E-3DBEE34A1341}" type="datetimeFigureOut">
               <a:rPr lang="en-DK" smtClean="0"/>
-              <a:t>30/04/2024</a:t>
+              <a:t>23/08/2024</a:t>
             </a:fld>
             <a:endParaRPr lang="en-DK"/>
           </a:p>
@@ -698,7 +698,7 @@
           <a:p>
             <a:fld id="{7DDDC050-38A8-4345-B03D-0BCEEAE44E94}" type="datetimeFigureOut">
               <a:rPr lang="en-DK" smtClean="0"/>
-              <a:t>30/04/2024</a:t>
+              <a:t>23/08/2024</a:t>
             </a:fld>
             <a:endParaRPr lang="en-DK"/>
           </a:p>
@@ -898,7 +898,7 @@
           <a:p>
             <a:fld id="{7DDDC050-38A8-4345-B03D-0BCEEAE44E94}" type="datetimeFigureOut">
               <a:rPr lang="en-DK" smtClean="0"/>
-              <a:t>30/04/2024</a:t>
+              <a:t>23/08/2024</a:t>
             </a:fld>
             <a:endParaRPr lang="en-DK"/>
           </a:p>
@@ -1108,7 +1108,7 @@
           <a:p>
             <a:fld id="{7DDDC050-38A8-4345-B03D-0BCEEAE44E94}" type="datetimeFigureOut">
               <a:rPr lang="en-DK" smtClean="0"/>
-              <a:t>30/04/2024</a:t>
+              <a:t>23/08/2024</a:t>
             </a:fld>
             <a:endParaRPr lang="en-DK"/>
           </a:p>
@@ -1308,7 +1308,7 @@
           <a:p>
             <a:fld id="{7DDDC050-38A8-4345-B03D-0BCEEAE44E94}" type="datetimeFigureOut">
               <a:rPr lang="en-DK" smtClean="0"/>
-              <a:t>30/04/2024</a:t>
+              <a:t>23/08/2024</a:t>
             </a:fld>
             <a:endParaRPr lang="en-DK"/>
           </a:p>
@@ -1584,7 +1584,7 @@
           <a:p>
             <a:fld id="{7DDDC050-38A8-4345-B03D-0BCEEAE44E94}" type="datetimeFigureOut">
               <a:rPr lang="en-DK" smtClean="0"/>
-              <a:t>30/04/2024</a:t>
+              <a:t>23/08/2024</a:t>
             </a:fld>
             <a:endParaRPr lang="en-DK"/>
           </a:p>
@@ -1852,7 +1852,7 @@
           <a:p>
             <a:fld id="{7DDDC050-38A8-4345-B03D-0BCEEAE44E94}" type="datetimeFigureOut">
               <a:rPr lang="en-DK" smtClean="0"/>
-              <a:t>30/04/2024</a:t>
+              <a:t>23/08/2024</a:t>
             </a:fld>
             <a:endParaRPr lang="en-DK"/>
           </a:p>
@@ -2267,7 +2267,7 @@
           <a:p>
             <a:fld id="{7DDDC050-38A8-4345-B03D-0BCEEAE44E94}" type="datetimeFigureOut">
               <a:rPr lang="en-DK" smtClean="0"/>
-              <a:t>30/04/2024</a:t>
+              <a:t>23/08/2024</a:t>
             </a:fld>
             <a:endParaRPr lang="en-DK"/>
           </a:p>
@@ -2409,7 +2409,7 @@
           <a:p>
             <a:fld id="{7DDDC050-38A8-4345-B03D-0BCEEAE44E94}" type="datetimeFigureOut">
               <a:rPr lang="en-DK" smtClean="0"/>
-              <a:t>30/04/2024</a:t>
+              <a:t>23/08/2024</a:t>
             </a:fld>
             <a:endParaRPr lang="en-DK"/>
           </a:p>
@@ -2522,7 +2522,7 @@
           <a:p>
             <a:fld id="{7DDDC050-38A8-4345-B03D-0BCEEAE44E94}" type="datetimeFigureOut">
               <a:rPr lang="en-DK" smtClean="0"/>
-              <a:t>30/04/2024</a:t>
+              <a:t>23/08/2024</a:t>
             </a:fld>
             <a:endParaRPr lang="en-DK"/>
           </a:p>
@@ -2835,7 +2835,7 @@
           <a:p>
             <a:fld id="{7DDDC050-38A8-4345-B03D-0BCEEAE44E94}" type="datetimeFigureOut">
               <a:rPr lang="en-DK" smtClean="0"/>
-              <a:t>30/04/2024</a:t>
+              <a:t>23/08/2024</a:t>
             </a:fld>
             <a:endParaRPr lang="en-DK"/>
           </a:p>
@@ -3124,7 +3124,7 @@
           <a:p>
             <a:fld id="{7DDDC050-38A8-4345-B03D-0BCEEAE44E94}" type="datetimeFigureOut">
               <a:rPr lang="en-DK" smtClean="0"/>
-              <a:t>30/04/2024</a:t>
+              <a:t>23/08/2024</a:t>
             </a:fld>
             <a:endParaRPr lang="en-DK"/>
           </a:p>
@@ -3367,7 +3367,7 @@
           <a:p>
             <a:fld id="{7DDDC050-38A8-4345-B03D-0BCEEAE44E94}" type="datetimeFigureOut">
               <a:rPr lang="en-DK" smtClean="0"/>
-              <a:t>30/04/2024</a:t>
+              <a:t>23/08/2024</a:t>
             </a:fld>
             <a:endParaRPr lang="en-DK"/>
           </a:p>
@@ -5020,8 +5020,8 @@
         </p:nvSpPr>
         <p:spPr>
           <a:xfrm>
-            <a:off x="2202935" y="154417"/>
-            <a:ext cx="6187464" cy="400110"/>
+            <a:off x="1984376" y="168919"/>
+            <a:ext cx="6624570" cy="400110"/>
           </a:xfrm>
           <a:prstGeom prst="rect">
             <a:avLst/>
@@ -5039,7 +5039,7 @@
               <a:rPr lang="en-DK" sz="2000" b="1" dirty="0">
                 <a:latin typeface="Avenir Next" panose="020B0503020202020204" pitchFamily="34" charset="0"/>
               </a:rPr>
-              <a:t>Psychiatric Signature of Stomach-Brain Coupling</a:t>
+              <a:t>Mental Health Signature of Stomach-Brain Coupling</a:t>
             </a:r>
           </a:p>
         </p:txBody>

</xml_diff>